<commit_message>
Update 19 Präsentation und Demo.pptx
</commit_message>
<xml_diff>
--- a/Projekt Diagramme/19 Präsentation und Demo.pptx
+++ b/Projekt Diagramme/19 Präsentation und Demo.pptx
@@ -2,7 +2,7 @@
 <file path=ppt/presentation.xml><?xml version="1.0" encoding="utf-8"?>
 <p:presentation xmlns:a="http://schemas.openxmlformats.org/drawingml/2006/main" xmlns:r="http://schemas.openxmlformats.org/officeDocument/2006/relationships" xmlns:p="http://schemas.openxmlformats.org/presentationml/2006/main" saveSubsetFonts="1">
   <p:sldMasterIdLst>
-    <p:sldMasterId id="2147483708" r:id="rId1"/>
+    <p:sldMasterId id="2147483720" r:id="rId1"/>
   </p:sldMasterIdLst>
   <p:notesMasterIdLst>
     <p:notesMasterId r:id="rId9"/>
@@ -388,7 +388,7 @@
           <a:p>
             <a:fld id="{931F7AED-2DAC-4AE3-B4FC-DC8DBCBB2D2B}" type="slidenum">
               <a:rPr lang="en-US" smtClean="0"/>
-              <a:t>‹#›</a:t>
+              <a:t>‹Nr.›</a:t>
             </a:fld>
             <a:endParaRPr lang="en-US"/>
           </a:p>
@@ -1770,45 +1770,684 @@
           <a:lstStyle/>
           <a:p>
             <a:r>
-              <a:rPr lang="en-US" dirty="0"/>
-              <a:t>Design by contract</a:t>
-            </a:r>
-          </a:p>
-          <a:p>
-            <a:r>
-              <a:rPr lang="en-US" dirty="0"/>
+              <a:rPr lang="en-US" b="0" dirty="0"/>
+              <a:t>Singe Responsibility Principle JA</a:t>
+            </a:r>
+          </a:p>
+          <a:p>
+            <a:pPr lvl="1"/>
+            <a:r>
+              <a:rPr lang="en-US" b="0" dirty="0"/>
+              <a:t>Klassen </a:t>
+            </a:r>
+            <a:r>
+              <a:rPr lang="en-US" b="0" dirty="0" err="1"/>
+              <a:t>nur</a:t>
+            </a:r>
+            <a:r>
+              <a:rPr lang="en-US" b="0" dirty="0"/>
+              <a:t> </a:t>
+            </a:r>
+            <a:r>
+              <a:rPr lang="en-US" b="0" dirty="0" err="1"/>
+              <a:t>eine</a:t>
+            </a:r>
+            <a:r>
+              <a:rPr lang="en-US" b="0" dirty="0"/>
+              <a:t> </a:t>
+            </a:r>
+            <a:r>
+              <a:rPr lang="en-US" b="0" dirty="0" err="1"/>
+              <a:t>Verantwortlickeit</a:t>
+            </a:r>
+            <a:endParaRPr lang="en-US" b="0" dirty="0"/>
+          </a:p>
+          <a:p>
+            <a:pPr lvl="1"/>
+            <a:r>
+              <a:rPr lang="en-US" b="0" dirty="0" err="1"/>
+              <a:t>Viele</a:t>
+            </a:r>
+            <a:r>
+              <a:rPr lang="en-US" b="0" dirty="0"/>
+              <a:t> </a:t>
+            </a:r>
+            <a:r>
+              <a:rPr lang="en-US" b="0" dirty="0" err="1"/>
+              <a:t>kleine</a:t>
+            </a:r>
+            <a:r>
+              <a:rPr lang="en-US" b="0" dirty="0"/>
+              <a:t> </a:t>
+            </a:r>
+            <a:r>
+              <a:rPr lang="en-US" b="0" dirty="0" err="1"/>
+              <a:t>klassen</a:t>
+            </a:r>
+            <a:r>
+              <a:rPr lang="en-US" b="0" dirty="0"/>
+              <a:t>. </a:t>
+            </a:r>
+          </a:p>
+          <a:p>
+            <a:pPr lvl="1"/>
+            <a:r>
+              <a:rPr lang="en-US" b="0" dirty="0" err="1"/>
+              <a:t>Schranke</a:t>
+            </a:r>
+            <a:r>
+              <a:rPr lang="en-US" b="0" dirty="0"/>
+              <a:t> </a:t>
+            </a:r>
+            <a:r>
+              <a:rPr lang="en-US" b="0" dirty="0" err="1"/>
+              <a:t>geteilt</a:t>
+            </a:r>
+            <a:r>
+              <a:rPr lang="en-US" b="0" dirty="0"/>
+              <a:t> von </a:t>
+            </a:r>
+            <a:r>
+              <a:rPr lang="en-US" b="0" dirty="0" err="1"/>
+              <a:t>parkhaus</a:t>
+            </a:r>
+            <a:r>
+              <a:rPr lang="en-US" b="0" dirty="0"/>
+              <a:t>. </a:t>
+            </a:r>
+            <a:r>
+              <a:rPr lang="en-US" b="0" dirty="0" err="1"/>
+              <a:t>Parkhaus</a:t>
+            </a:r>
+            <a:r>
+              <a:rPr lang="en-US" b="0" dirty="0"/>
+              <a:t> </a:t>
+            </a:r>
+            <a:r>
+              <a:rPr lang="en-US" b="0" dirty="0" err="1"/>
+              <a:t>nur</a:t>
+            </a:r>
+            <a:r>
+              <a:rPr lang="en-US" b="0" dirty="0"/>
+              <a:t> </a:t>
+            </a:r>
+            <a:r>
+              <a:rPr lang="en-US" b="0" dirty="0" err="1"/>
+              <a:t>verwaltung</a:t>
+            </a:r>
+            <a:r>
+              <a:rPr lang="en-US" b="0" dirty="0"/>
+              <a:t> </a:t>
+            </a:r>
+          </a:p>
+          <a:p>
+            <a:pPr lvl="1"/>
+            <a:r>
+              <a:rPr lang="en-US" b="0" dirty="0" err="1"/>
+              <a:t>Schranke</a:t>
+            </a:r>
+            <a:r>
+              <a:rPr lang="en-US" b="0" dirty="0"/>
+              <a:t> </a:t>
+            </a:r>
+            <a:r>
+              <a:rPr lang="en-US" b="0" dirty="0" err="1"/>
+              <a:t>prüft</a:t>
+            </a:r>
+            <a:r>
+              <a:rPr lang="en-US" b="0" dirty="0"/>
+              <a:t> </a:t>
+            </a:r>
+            <a:r>
+              <a:rPr lang="en-US" b="0" dirty="0" err="1"/>
+              <a:t>ob</a:t>
+            </a:r>
+            <a:r>
+              <a:rPr lang="en-US" b="0" dirty="0"/>
+              <a:t> ticket ok </a:t>
+            </a:r>
+            <a:r>
+              <a:rPr lang="en-US" b="0" dirty="0" err="1"/>
+              <a:t>ist</a:t>
+            </a:r>
+            <a:endParaRPr lang="en-US" b="0" dirty="0"/>
+          </a:p>
+          <a:p>
+            <a:pPr lvl="1"/>
+            <a:endParaRPr lang="en-US" b="0" dirty="0"/>
+          </a:p>
+          <a:p>
+            <a:r>
+              <a:rPr lang="en-US" b="0" dirty="0"/>
+              <a:t>Open/</a:t>
+            </a:r>
+            <a:r>
+              <a:rPr lang="en-US" b="0" dirty="0" err="1"/>
+              <a:t>Closend</a:t>
+            </a:r>
+            <a:r>
+              <a:rPr lang="en-US" b="0" dirty="0"/>
+              <a:t> Principle NEIN</a:t>
+            </a:r>
+          </a:p>
+          <a:p>
+            <a:r>
+              <a:rPr lang="en-US" b="0" dirty="0"/>
               <a:t>	</a:t>
             </a:r>
             <a:r>
-              <a:rPr lang="en-US" dirty="0" err="1"/>
-              <a:t>schnittstellen</a:t>
-            </a:r>
-            <a:r>
-              <a:rPr lang="en-US" dirty="0"/>
+              <a:rPr lang="en-US" b="0" dirty="0" err="1"/>
+              <a:t>bei</a:t>
+            </a:r>
+            <a:r>
+              <a:rPr lang="en-US" b="0" dirty="0"/>
               <a:t> </a:t>
             </a:r>
             <a:r>
-              <a:rPr lang="en-US" dirty="0" err="1"/>
-              <a:t>mit</a:t>
-            </a:r>
-            <a:r>
-              <a:rPr lang="en-US" dirty="0"/>
+              <a:rPr lang="en-US" b="0" dirty="0" err="1"/>
+              <a:t>erweiterung</a:t>
+            </a:r>
+            <a:r>
+              <a:rPr lang="en-US" b="0" dirty="0"/>
+              <a:t> direct in den </a:t>
+            </a:r>
+            <a:r>
+              <a:rPr lang="en-US" b="0" dirty="0" err="1"/>
+              <a:t>klassen</a:t>
+            </a:r>
+            <a:r>
+              <a:rPr lang="en-US" b="0" dirty="0"/>
               <a:t> </a:t>
             </a:r>
             <a:r>
-              <a:rPr lang="en-US" dirty="0" err="1"/>
-              <a:t>verträge</a:t>
-            </a:r>
-            <a:r>
-              <a:rPr lang="en-US" dirty="0"/>
+              <a:rPr lang="en-US" b="0" dirty="0" err="1"/>
+              <a:t>geändert</a:t>
+            </a:r>
+            <a:endParaRPr lang="en-US" b="0" dirty="0"/>
+          </a:p>
+          <a:p>
+            <a:r>
+              <a:rPr lang="en-US" b="0" dirty="0"/>
+              <a:t>	</a:t>
+            </a:r>
+            <a:r>
+              <a:rPr lang="en-US" b="0" dirty="0" err="1"/>
+              <a:t>ohne</a:t>
+            </a:r>
+            <a:r>
+              <a:rPr lang="en-US" b="0" dirty="0"/>
               <a:t> </a:t>
             </a:r>
-          </a:p>
-          <a:p>
-            <a:r>
-              <a:rPr lang="en-US" dirty="0"/>
-              <a:t>	precondition, postcondition</a:t>
-            </a:r>
+            <a:r>
+              <a:rPr lang="en-US" b="0" dirty="0" err="1"/>
+              <a:t>unterklassen</a:t>
+            </a:r>
+            <a:endParaRPr lang="en-US" b="0" dirty="0"/>
+          </a:p>
+          <a:p>
+            <a:endParaRPr lang="en-US" b="0" dirty="0"/>
+          </a:p>
+          <a:p>
+            <a:r>
+              <a:rPr lang="en-US" b="0" dirty="0" err="1"/>
+              <a:t>Liskovsches</a:t>
+            </a:r>
+            <a:r>
+              <a:rPr lang="en-US" b="0" dirty="0"/>
+              <a:t> Substitutions </a:t>
+            </a:r>
+            <a:r>
+              <a:rPr lang="en-US" b="0" dirty="0" err="1"/>
+              <a:t>Prinzip</a:t>
+            </a:r>
+            <a:r>
+              <a:rPr lang="en-US" b="0" dirty="0"/>
+              <a:t> JA</a:t>
+            </a:r>
+          </a:p>
+          <a:p>
+            <a:r>
+              <a:rPr lang="en-US" b="0" dirty="0"/>
+              <a:t>	ticket &lt;|- </a:t>
+            </a:r>
+            <a:r>
+              <a:rPr lang="en-US" b="0" dirty="0" err="1"/>
+              <a:t>parkausweis</a:t>
+            </a:r>
+            <a:endParaRPr lang="en-US" b="0" dirty="0"/>
+          </a:p>
+          <a:p>
+            <a:r>
+              <a:rPr lang="en-US" b="0" dirty="0"/>
+              <a:t>	user &lt;|- </a:t>
+            </a:r>
+            <a:r>
+              <a:rPr lang="en-US" b="0" dirty="0" err="1"/>
+              <a:t>abonnent</a:t>
+            </a:r>
+            <a:endParaRPr lang="en-US" b="0" dirty="0"/>
+          </a:p>
+          <a:p>
+            <a:r>
+              <a:rPr lang="en-US" b="0" dirty="0"/>
+              <a:t>	</a:t>
+            </a:r>
+            <a:r>
+              <a:rPr lang="en-US" b="0" dirty="0" err="1"/>
+              <a:t>verhalten</a:t>
+            </a:r>
+            <a:r>
+              <a:rPr lang="en-US" b="0" dirty="0"/>
+              <a:t> </a:t>
+            </a:r>
+            <a:r>
+              <a:rPr lang="en-US" b="0" dirty="0" err="1"/>
+              <a:t>sich</a:t>
+            </a:r>
+            <a:r>
+              <a:rPr lang="en-US" b="0" dirty="0"/>
+              <a:t> </a:t>
+            </a:r>
+            <a:r>
+              <a:rPr lang="en-US" b="0" dirty="0" err="1"/>
+              <a:t>oberklassenkonform</a:t>
+            </a:r>
+            <a:endParaRPr lang="en-US" b="0" dirty="0"/>
+          </a:p>
+          <a:p>
+            <a:endParaRPr lang="en-US" b="0" dirty="0"/>
+          </a:p>
+          <a:p>
+            <a:r>
+              <a:rPr lang="en-US" b="0" dirty="0"/>
+              <a:t>Interface Segregation JA</a:t>
+            </a:r>
+          </a:p>
+          <a:p>
+            <a:r>
+              <a:rPr lang="en-US" b="0" dirty="0"/>
+              <a:t>	interfaces </a:t>
+            </a:r>
+            <a:r>
+              <a:rPr lang="en-US" b="0" dirty="0" err="1"/>
+              <a:t>für</a:t>
+            </a:r>
+            <a:r>
+              <a:rPr lang="en-US" b="0" dirty="0"/>
+              <a:t> </a:t>
+            </a:r>
+            <a:r>
+              <a:rPr lang="en-US" b="0" dirty="0" err="1"/>
+              <a:t>klassen</a:t>
+            </a:r>
+            <a:r>
+              <a:rPr lang="en-US" b="0" dirty="0"/>
+              <a:t> </a:t>
+            </a:r>
+            <a:r>
+              <a:rPr lang="en-US" b="0" dirty="0" err="1"/>
+              <a:t>nur</a:t>
+            </a:r>
+            <a:r>
+              <a:rPr lang="en-US" b="0" dirty="0"/>
+              <a:t> so </a:t>
+            </a:r>
+            <a:r>
+              <a:rPr lang="en-US" b="0" dirty="0" err="1"/>
+              <a:t>groß</a:t>
+            </a:r>
+            <a:r>
+              <a:rPr lang="en-US" b="0" dirty="0"/>
+              <a:t> </a:t>
+            </a:r>
+            <a:r>
+              <a:rPr lang="en-US" b="0" dirty="0" err="1"/>
+              <a:t>wie</a:t>
+            </a:r>
+            <a:r>
+              <a:rPr lang="en-US" b="0" dirty="0"/>
+              <a:t> </a:t>
+            </a:r>
+            <a:r>
+              <a:rPr lang="en-US" b="0" dirty="0" err="1"/>
+              <a:t>sie</a:t>
+            </a:r>
+            <a:r>
+              <a:rPr lang="en-US" b="0" dirty="0"/>
+              <a:t> sein </a:t>
+            </a:r>
+            <a:r>
+              <a:rPr lang="en-US" b="0" dirty="0" err="1"/>
+              <a:t>müssen</a:t>
+            </a:r>
+            <a:endParaRPr lang="en-US" b="0" dirty="0"/>
+          </a:p>
+          <a:p>
+            <a:endParaRPr lang="en-US" b="0" dirty="0"/>
+          </a:p>
+          <a:p>
+            <a:r>
+              <a:rPr lang="en-US" b="0" dirty="0"/>
+              <a:t>Dependency Inversion Principle NEIN</a:t>
+            </a:r>
+          </a:p>
+          <a:p>
+            <a:r>
+              <a:rPr lang="en-US" b="0" dirty="0"/>
+              <a:t>	Module </a:t>
+            </a:r>
+            <a:r>
+              <a:rPr lang="en-US" b="0" dirty="0" err="1"/>
+              <a:t>Niedrigerer</a:t>
+            </a:r>
+            <a:r>
+              <a:rPr lang="en-US" b="0" dirty="0"/>
+              <a:t> </a:t>
+            </a:r>
+            <a:r>
+              <a:rPr lang="en-US" b="0" dirty="0" err="1"/>
+              <a:t>Ebenen</a:t>
+            </a:r>
+            <a:r>
+              <a:rPr lang="en-US" b="0" dirty="0"/>
+              <a:t> direct </a:t>
+            </a:r>
+            <a:r>
+              <a:rPr lang="en-US" b="0" dirty="0" err="1"/>
+              <a:t>verwendet</a:t>
+            </a:r>
+            <a:r>
+              <a:rPr lang="en-US" b="0" dirty="0"/>
+              <a:t>.</a:t>
+            </a:r>
+          </a:p>
+          <a:p>
+            <a:r>
+              <a:rPr lang="en-US" b="0" dirty="0"/>
+              <a:t>	</a:t>
+            </a:r>
+            <a:r>
+              <a:rPr lang="en-US" b="0" dirty="0" err="1"/>
+              <a:t>ohne</a:t>
+            </a:r>
+            <a:r>
+              <a:rPr lang="en-US" b="0" dirty="0"/>
+              <a:t> Interface</a:t>
+            </a:r>
+          </a:p>
+          <a:p>
+            <a:r>
+              <a:rPr lang="en-US" b="0" dirty="0"/>
+              <a:t>	</a:t>
+            </a:r>
+            <a:r>
+              <a:rPr lang="en-US" b="0" dirty="0" err="1"/>
+              <a:t>z.b</a:t>
+            </a:r>
+            <a:r>
+              <a:rPr lang="en-US" b="0" dirty="0"/>
+              <a:t>. Array List </a:t>
+            </a:r>
+            <a:r>
+              <a:rPr lang="en-US" b="0" dirty="0" err="1"/>
+              <a:t>oder</a:t>
+            </a:r>
+            <a:r>
+              <a:rPr lang="en-US" b="0" dirty="0"/>
+              <a:t> </a:t>
+            </a:r>
+          </a:p>
+          <a:p>
+            <a:r>
+              <a:rPr lang="en-US" b="0" dirty="0"/>
+              <a:t>	</a:t>
+            </a:r>
+            <a:r>
+              <a:rPr lang="en-US" b="0" dirty="0" err="1"/>
+              <a:t>z.b</a:t>
+            </a:r>
+            <a:r>
+              <a:rPr lang="en-US" b="0" dirty="0"/>
+              <a:t>. </a:t>
+            </a:r>
+            <a:r>
+              <a:rPr lang="en-US" b="0" dirty="0" err="1"/>
+              <a:t>parkplatz</a:t>
+            </a:r>
+            <a:r>
+              <a:rPr lang="en-US" b="0" dirty="0"/>
+              <a:t> &lt; </a:t>
+            </a:r>
+            <a:r>
+              <a:rPr lang="en-US" b="0" dirty="0" err="1"/>
+              <a:t>Parkebene</a:t>
+            </a:r>
+            <a:r>
+              <a:rPr lang="en-US" b="0" dirty="0"/>
+              <a:t> &lt; </a:t>
+            </a:r>
+            <a:r>
+              <a:rPr lang="en-US" b="0" dirty="0" err="1"/>
+              <a:t>Parkhaus</a:t>
+            </a:r>
+            <a:endParaRPr lang="en-US" b="0" dirty="0"/>
+          </a:p>
+          <a:p>
+            <a:endParaRPr lang="en-US" b="0" dirty="0"/>
+          </a:p>
+          <a:p>
+            <a:endParaRPr lang="en-US" b="0" dirty="0"/>
+          </a:p>
+          <a:p>
+            <a:pPr marL="0" marR="0" lvl="0" indent="0" algn="l" defTabSz="914400" rtl="0" eaLnBrk="1" fontAlgn="auto" latinLnBrk="0" hangingPunct="1">
+              <a:lnSpc>
+                <a:spcPct val="100000"/>
+              </a:lnSpc>
+              <a:spcBef>
+                <a:spcPts val="0"/>
+              </a:spcBef>
+              <a:spcAft>
+                <a:spcPts val="0"/>
+              </a:spcAft>
+              <a:buClrTx/>
+              <a:buSzTx/>
+              <a:buFontTx/>
+              <a:buNone/>
+              <a:tabLst/>
+              <a:defRPr/>
+            </a:pPr>
+            <a:r>
+              <a:rPr lang="en-US" b="0" dirty="0"/>
+              <a:t>Design by Contract (</a:t>
+            </a:r>
+            <a:r>
+              <a:rPr lang="en-US" b="0" dirty="0" err="1"/>
+              <a:t>nicht</a:t>
+            </a:r>
+            <a:r>
+              <a:rPr lang="en-US" b="0" dirty="0"/>
+              <a:t> </a:t>
+            </a:r>
+            <a:r>
+              <a:rPr lang="en-US" b="0" dirty="0" err="1"/>
+              <a:t>mehr</a:t>
+            </a:r>
+            <a:r>
+              <a:rPr lang="en-US" b="0" dirty="0"/>
+              <a:t> SOLID)</a:t>
+            </a:r>
+          </a:p>
+          <a:p>
+            <a:pPr marL="0" marR="0" lvl="0" indent="0" algn="l" defTabSz="914400" rtl="0" eaLnBrk="1" fontAlgn="auto" latinLnBrk="0" hangingPunct="1">
+              <a:lnSpc>
+                <a:spcPct val="100000"/>
+              </a:lnSpc>
+              <a:spcBef>
+                <a:spcPts val="0"/>
+              </a:spcBef>
+              <a:spcAft>
+                <a:spcPts val="0"/>
+              </a:spcAft>
+              <a:buClrTx/>
+              <a:buSzTx/>
+              <a:buFontTx/>
+              <a:buNone/>
+              <a:tabLst/>
+              <a:defRPr/>
+            </a:pPr>
+            <a:r>
+              <a:rPr lang="en-US" b="0" dirty="0"/>
+              <a:t>	</a:t>
+            </a:r>
+            <a:r>
+              <a:rPr lang="en-US" b="0" dirty="0" err="1"/>
+              <a:t>Parkhaus</a:t>
+            </a:r>
+            <a:r>
+              <a:rPr lang="en-US" b="0" dirty="0"/>
+              <a:t> </a:t>
+            </a:r>
+            <a:r>
+              <a:rPr lang="en-US" b="0" dirty="0" err="1"/>
+              <a:t>prüft</a:t>
+            </a:r>
+            <a:r>
+              <a:rPr lang="en-US" b="0" dirty="0"/>
+              <a:t> </a:t>
+            </a:r>
+            <a:r>
+              <a:rPr lang="en-US" b="0" dirty="0" err="1"/>
+              <a:t>keine</a:t>
+            </a:r>
+            <a:r>
+              <a:rPr lang="en-US" b="0" dirty="0"/>
+              <a:t> </a:t>
+            </a:r>
+            <a:r>
+              <a:rPr lang="en-US" b="0" dirty="0" err="1"/>
+              <a:t>nachbedingungen</a:t>
+            </a:r>
+            <a:r>
+              <a:rPr lang="en-US" b="0" dirty="0"/>
+              <a:t> von den </a:t>
+            </a:r>
+            <a:r>
+              <a:rPr lang="en-US" b="0" dirty="0" err="1"/>
+              <a:t>Modulen</a:t>
+            </a:r>
+            <a:r>
+              <a:rPr lang="en-US" b="0" dirty="0"/>
+              <a:t>.</a:t>
+            </a:r>
+          </a:p>
+          <a:p>
+            <a:pPr marL="0" marR="0" lvl="0" indent="0" algn="l" defTabSz="914400" rtl="0" eaLnBrk="1" fontAlgn="auto" latinLnBrk="0" hangingPunct="1">
+              <a:lnSpc>
+                <a:spcPct val="100000"/>
+              </a:lnSpc>
+              <a:spcBef>
+                <a:spcPts val="0"/>
+              </a:spcBef>
+              <a:spcAft>
+                <a:spcPts val="0"/>
+              </a:spcAft>
+              <a:buClrTx/>
+              <a:buSzTx/>
+              <a:buFontTx/>
+              <a:buNone/>
+              <a:tabLst/>
+              <a:defRPr/>
+            </a:pPr>
+            <a:r>
+              <a:rPr lang="en-US" b="0" dirty="0"/>
+              <a:t>	</a:t>
+            </a:r>
+            <a:r>
+              <a:rPr lang="en-US" b="0" dirty="0" err="1"/>
+              <a:t>Parkhaus</a:t>
+            </a:r>
+            <a:r>
+              <a:rPr lang="en-US" b="0" dirty="0"/>
+              <a:t> </a:t>
+            </a:r>
+            <a:r>
+              <a:rPr lang="en-US" b="0" dirty="0" err="1"/>
+              <a:t>ist</a:t>
+            </a:r>
+            <a:r>
+              <a:rPr lang="en-US" b="0" dirty="0"/>
+              <a:t> client, </a:t>
+            </a:r>
+          </a:p>
+          <a:p>
+            <a:pPr marL="0" marR="0" lvl="0" indent="0" algn="l" defTabSz="914400" rtl="0" eaLnBrk="1" fontAlgn="auto" latinLnBrk="0" hangingPunct="1">
+              <a:lnSpc>
+                <a:spcPct val="100000"/>
+              </a:lnSpc>
+              <a:spcBef>
+                <a:spcPts val="0"/>
+              </a:spcBef>
+              <a:spcAft>
+                <a:spcPts val="0"/>
+              </a:spcAft>
+              <a:buClrTx/>
+              <a:buSzTx/>
+              <a:buFontTx/>
+              <a:buNone/>
+              <a:tabLst/>
+              <a:defRPr/>
+            </a:pPr>
+            <a:r>
+              <a:rPr lang="en-US" b="0" dirty="0"/>
+              <a:t>	</a:t>
+            </a:r>
+            <a:r>
+              <a:rPr lang="en-US" b="0" dirty="0" err="1"/>
+              <a:t>Parkebene</a:t>
+            </a:r>
+            <a:r>
+              <a:rPr lang="en-US" b="0" dirty="0"/>
+              <a:t>, </a:t>
+            </a:r>
+            <a:r>
+              <a:rPr lang="en-US" b="0" dirty="0" err="1"/>
+              <a:t>Schranke</a:t>
+            </a:r>
+            <a:r>
+              <a:rPr lang="en-US" b="0" dirty="0"/>
+              <a:t> </a:t>
+            </a:r>
+            <a:r>
+              <a:rPr lang="en-US" b="0" dirty="0" err="1"/>
+              <a:t>sind</a:t>
+            </a:r>
+            <a:r>
+              <a:rPr lang="en-US" b="0" dirty="0"/>
+              <a:t> Server</a:t>
+            </a:r>
+          </a:p>
+          <a:p>
+            <a:pPr marL="0" marR="0" lvl="0" indent="0" algn="l" defTabSz="914400" rtl="0" eaLnBrk="1" fontAlgn="auto" latinLnBrk="0" hangingPunct="1">
+              <a:lnSpc>
+                <a:spcPct val="100000"/>
+              </a:lnSpc>
+              <a:spcBef>
+                <a:spcPts val="0"/>
+              </a:spcBef>
+              <a:spcAft>
+                <a:spcPts val="0"/>
+              </a:spcAft>
+              <a:buClrTx/>
+              <a:buSzTx/>
+              <a:buFontTx/>
+              <a:buNone/>
+              <a:tabLst/>
+              <a:defRPr/>
+            </a:pPr>
+            <a:endParaRPr lang="en-US" b="0" dirty="0"/>
+          </a:p>
+          <a:p>
+            <a:endParaRPr lang="en-US" b="0" dirty="0"/>
           </a:p>
           <a:p>
             <a:endParaRPr lang="en-US" dirty="0"/>
@@ -1852,17 +2491,12 @@
 </file>
 
 <file path=ppt/slideLayouts/slideLayout1.xml><?xml version="1.0" encoding="utf-8"?>
-<p:sldLayout xmlns:a="http://schemas.openxmlformats.org/drawingml/2006/main" xmlns:r="http://schemas.openxmlformats.org/officeDocument/2006/relationships" xmlns:p="http://schemas.openxmlformats.org/presentationml/2006/main" showMasterSp="0" type="title" preserve="1">
+<p:sldLayout xmlns:a="http://schemas.openxmlformats.org/drawingml/2006/main" xmlns:r="http://schemas.openxmlformats.org/officeDocument/2006/relationships" xmlns:p="http://schemas.openxmlformats.org/presentationml/2006/main" type="title" preserve="1">
   <p:cSld name="Titelfolie">
     <p:bg>
-      <p:bgPr>
-        <a:solidFill>
-          <a:schemeClr val="bg2">
-            <a:lumMod val="75000"/>
-          </a:schemeClr>
-        </a:solidFill>
-        <a:effectLst/>
-      </p:bgPr>
+      <p:bgRef idx="1001">
+        <a:schemeClr val="bg2"/>
+      </p:bgRef>
     </p:bg>
     <p:spTree>
       <p:nvGrpSpPr>
@@ -1942,7 +2576,7 @@
           <a:lstStyle>
             <a:lvl1pPr marL="0" indent="0" algn="l">
               <a:buNone/>
-              <a:defRPr sz="2200" baseline="0">
+              <a:defRPr sz="2200" spc="30" baseline="0">
                 <a:solidFill>
                   <a:schemeClr val="tx1">
                     <a:lumMod val="75000"/>
@@ -1994,101 +2628,6 @@
       </p:sp>
       <p:sp>
         <p:nvSpPr>
-          <p:cNvPr id="4" name="Date Placeholder 3"/>
-          <p:cNvSpPr>
-            <a:spLocks noGrp="1"/>
-          </p:cNvSpPr>
-          <p:nvPr>
-            <p:ph type="dt" sz="half" idx="10"/>
-          </p:nvPr>
-        </p:nvSpPr>
-        <p:spPr/>
-        <p:txBody>
-          <a:bodyPr/>
-          <a:lstStyle>
-            <a:lvl1pPr>
-              <a:defRPr>
-                <a:solidFill>
-                  <a:schemeClr val="tx1">
-                    <a:lumMod val="50000"/>
-                  </a:schemeClr>
-                </a:solidFill>
-              </a:defRPr>
-            </a:lvl1pPr>
-          </a:lstStyle>
-          <a:p>
-            <a:fld id="{E7BF99E8-FAEF-4CCC-8B7E-FA481EAA1673}" type="datetimeFigureOut">
-              <a:rPr lang="en-US" smtClean="0"/>
-              <a:t>6/27/2019</a:t>
-            </a:fld>
-            <a:endParaRPr lang="en-US"/>
-          </a:p>
-        </p:txBody>
-      </p:sp>
-      <p:sp>
-        <p:nvSpPr>
-          <p:cNvPr id="5" name="Footer Placeholder 4"/>
-          <p:cNvSpPr>
-            <a:spLocks noGrp="1"/>
-          </p:cNvSpPr>
-          <p:nvPr>
-            <p:ph type="ftr" sz="quarter" idx="11"/>
-          </p:nvPr>
-        </p:nvSpPr>
-        <p:spPr/>
-        <p:txBody>
-          <a:bodyPr/>
-          <a:lstStyle>
-            <a:lvl1pPr>
-              <a:defRPr>
-                <a:solidFill>
-                  <a:schemeClr val="tx1">
-                    <a:lumMod val="65000"/>
-                  </a:schemeClr>
-                </a:solidFill>
-              </a:defRPr>
-            </a:lvl1pPr>
-          </a:lstStyle>
-          <a:p>
-            <a:endParaRPr lang="en-US"/>
-          </a:p>
-        </p:txBody>
-      </p:sp>
-      <p:sp>
-        <p:nvSpPr>
-          <p:cNvPr id="6" name="Slide Number Placeholder 5"/>
-          <p:cNvSpPr>
-            <a:spLocks noGrp="1"/>
-          </p:cNvSpPr>
-          <p:nvPr>
-            <p:ph type="sldNum" sz="quarter" idx="12"/>
-          </p:nvPr>
-        </p:nvSpPr>
-        <p:spPr/>
-        <p:txBody>
-          <a:bodyPr/>
-          <a:lstStyle>
-            <a:lvl1pPr>
-              <a:defRPr>
-                <a:solidFill>
-                  <a:schemeClr val="tx1">
-                    <a:lumMod val="65000"/>
-                  </a:schemeClr>
-                </a:solidFill>
-              </a:defRPr>
-            </a:lvl1pPr>
-          </a:lstStyle>
-          <a:p>
-            <a:fld id="{53235728-76D6-45A1-8670-75A93D312883}" type="slidenum">
-              <a:rPr lang="en-US" smtClean="0"/>
-              <a:t>‹#›</a:t>
-            </a:fld>
-            <a:endParaRPr lang="en-US"/>
-          </a:p>
-        </p:txBody>
-      </p:sp>
-      <p:sp>
-        <p:nvSpPr>
           <p:cNvPr id="7" name="Rectangle 6"/>
           <p:cNvSpPr/>
           <p:nvPr/>
@@ -2102,7 +2641,10 @@
             <a:avLst/>
           </a:prstGeom>
           <a:solidFill>
-            <a:schemeClr val="accent1"/>
+            <a:schemeClr val="bg2">
+              <a:lumMod val="60000"/>
+              <a:lumOff val="40000"/>
+            </a:schemeClr>
           </a:solidFill>
           <a:ln>
             <a:noFill/>
@@ -2125,10 +2667,75 @@
           </a:fontRef>
         </p:style>
       </p:sp>
+      <p:sp>
+        <p:nvSpPr>
+          <p:cNvPr id="8" name="Date Placeholder 7"/>
+          <p:cNvSpPr>
+            <a:spLocks noGrp="1"/>
+          </p:cNvSpPr>
+          <p:nvPr>
+            <p:ph type="dt" sz="half" idx="10"/>
+          </p:nvPr>
+        </p:nvSpPr>
+        <p:spPr/>
+        <p:txBody>
+          <a:bodyPr/>
+          <a:lstStyle/>
+          <a:p>
+            <a:fld id="{E7BF99E8-FAEF-4CCC-8B7E-FA481EAA1673}" type="datetimeFigureOut">
+              <a:rPr lang="en-US" smtClean="0"/>
+              <a:t>6/27/2019</a:t>
+            </a:fld>
+            <a:endParaRPr lang="en-US"/>
+          </a:p>
+        </p:txBody>
+      </p:sp>
+      <p:sp>
+        <p:nvSpPr>
+          <p:cNvPr id="9" name="Footer Placeholder 8"/>
+          <p:cNvSpPr>
+            <a:spLocks noGrp="1"/>
+          </p:cNvSpPr>
+          <p:nvPr>
+            <p:ph type="ftr" sz="quarter" idx="11"/>
+          </p:nvPr>
+        </p:nvSpPr>
+        <p:spPr/>
+        <p:txBody>
+          <a:bodyPr/>
+          <a:lstStyle/>
+          <a:p>
+            <a:endParaRPr lang="en-US"/>
+          </a:p>
+        </p:txBody>
+      </p:sp>
+      <p:sp>
+        <p:nvSpPr>
+          <p:cNvPr id="10" name="Slide Number Placeholder 9"/>
+          <p:cNvSpPr>
+            <a:spLocks noGrp="1"/>
+          </p:cNvSpPr>
+          <p:nvPr>
+            <p:ph type="sldNum" sz="quarter" idx="12"/>
+          </p:nvPr>
+        </p:nvSpPr>
+        <p:spPr/>
+        <p:txBody>
+          <a:bodyPr/>
+          <a:lstStyle/>
+          <a:p>
+            <a:fld id="{53235728-76D6-45A1-8670-75A93D312883}" type="slidenum">
+              <a:rPr lang="en-US" smtClean="0"/>
+              <a:t>‹Nr.›</a:t>
+            </a:fld>
+            <a:endParaRPr lang="en-US"/>
+          </a:p>
+        </p:txBody>
+      </p:sp>
     </p:spTree>
     <p:extLst>
       <p:ext uri="{BB962C8B-B14F-4D97-AF65-F5344CB8AC3E}">
-        <p14:creationId xmlns:p14="http://schemas.microsoft.com/office/powerpoint/2010/main" val="3789689638"/>
+        <p14:creationId xmlns:p14="http://schemas.microsoft.com/office/powerpoint/2010/main" val="3986461460"/>
       </p:ext>
     </p:extLst>
   </p:cSld>
@@ -2289,16 +2896,57 @@
           <a:p>
             <a:fld id="{53235728-76D6-45A1-8670-75A93D312883}" type="slidenum">
               <a:rPr lang="en-US" smtClean="0"/>
-              <a:t>‹#›</a:t>
+              <a:t>‹Nr.›</a:t>
             </a:fld>
             <a:endParaRPr lang="en-US"/>
           </a:p>
         </p:txBody>
+      </p:sp>
+      <p:sp>
+        <p:nvSpPr>
+          <p:cNvPr id="7" name="Rectangle 6"/>
+          <p:cNvSpPr/>
+          <p:nvPr/>
+        </p:nvSpPr>
+        <p:spPr>
+          <a:xfrm>
+            <a:off x="0" y="0"/>
+            <a:ext cx="457200" cy="6858000"/>
+          </a:xfrm>
+          <a:prstGeom prst="rect">
+            <a:avLst/>
+          </a:prstGeom>
+          <a:solidFill>
+            <a:schemeClr val="tx2">
+              <a:lumMod val="60000"/>
+              <a:lumOff val="40000"/>
+            </a:schemeClr>
+          </a:solidFill>
+          <a:ln>
+            <a:noFill/>
+          </a:ln>
+        </p:spPr>
+        <p:style>
+          <a:lnRef idx="2">
+            <a:schemeClr val="accent1">
+              <a:shade val="50000"/>
+            </a:schemeClr>
+          </a:lnRef>
+          <a:fillRef idx="1">
+            <a:schemeClr val="accent1"/>
+          </a:fillRef>
+          <a:effectRef idx="0">
+            <a:schemeClr val="accent1"/>
+          </a:effectRef>
+          <a:fontRef idx="minor">
+            <a:schemeClr val="lt1"/>
+          </a:fontRef>
+        </p:style>
       </p:sp>
     </p:spTree>
     <p:extLst>
       <p:ext uri="{BB962C8B-B14F-4D97-AF65-F5344CB8AC3E}">
-        <p14:creationId xmlns:p14="http://schemas.microsoft.com/office/powerpoint/2010/main" val="601592072"/>
+        <p14:creationId xmlns:p14="http://schemas.microsoft.com/office/powerpoint/2010/main" val="2448466492"/>
       </p:ext>
     </p:extLst>
   </p:cSld>
@@ -2469,16 +3117,57 @@
           <a:p>
             <a:fld id="{53235728-76D6-45A1-8670-75A93D312883}" type="slidenum">
               <a:rPr lang="en-US" smtClean="0"/>
-              <a:t>‹#›</a:t>
+              <a:t>‹Nr.›</a:t>
             </a:fld>
             <a:endParaRPr lang="en-US"/>
           </a:p>
         </p:txBody>
+      </p:sp>
+      <p:sp>
+        <p:nvSpPr>
+          <p:cNvPr id="7" name="Rectangle 6"/>
+          <p:cNvSpPr/>
+          <p:nvPr/>
+        </p:nvSpPr>
+        <p:spPr>
+          <a:xfrm>
+            <a:off x="0" y="0"/>
+            <a:ext cx="457200" cy="6858000"/>
+          </a:xfrm>
+          <a:prstGeom prst="rect">
+            <a:avLst/>
+          </a:prstGeom>
+          <a:solidFill>
+            <a:schemeClr val="tx2">
+              <a:lumMod val="60000"/>
+              <a:lumOff val="40000"/>
+            </a:schemeClr>
+          </a:solidFill>
+          <a:ln>
+            <a:noFill/>
+          </a:ln>
+        </p:spPr>
+        <p:style>
+          <a:lnRef idx="2">
+            <a:schemeClr val="accent1">
+              <a:shade val="50000"/>
+            </a:schemeClr>
+          </a:lnRef>
+          <a:fillRef idx="1">
+            <a:schemeClr val="accent1"/>
+          </a:fillRef>
+          <a:effectRef idx="0">
+            <a:schemeClr val="accent1"/>
+          </a:effectRef>
+          <a:fontRef idx="minor">
+            <a:schemeClr val="lt1"/>
+          </a:fontRef>
+        </p:style>
       </p:sp>
     </p:spTree>
     <p:extLst>
       <p:ext uri="{BB962C8B-B14F-4D97-AF65-F5344CB8AC3E}">
-        <p14:creationId xmlns:p14="http://schemas.microsoft.com/office/powerpoint/2010/main" val="1921121494"/>
+        <p14:creationId xmlns:p14="http://schemas.microsoft.com/office/powerpoint/2010/main" val="1771068087"/>
       </p:ext>
     </p:extLst>
   </p:cSld>
@@ -2639,16 +3328,57 @@
           <a:p>
             <a:fld id="{53235728-76D6-45A1-8670-75A93D312883}" type="slidenum">
               <a:rPr lang="en-US" smtClean="0"/>
-              <a:t>‹#›</a:t>
+              <a:t>‹Nr.›</a:t>
             </a:fld>
             <a:endParaRPr lang="en-US"/>
           </a:p>
         </p:txBody>
+      </p:sp>
+      <p:sp>
+        <p:nvSpPr>
+          <p:cNvPr id="8" name="Rectangle 7"/>
+          <p:cNvSpPr/>
+          <p:nvPr/>
+        </p:nvSpPr>
+        <p:spPr>
+          <a:xfrm>
+            <a:off x="0" y="0"/>
+            <a:ext cx="457200" cy="6858000"/>
+          </a:xfrm>
+          <a:prstGeom prst="rect">
+            <a:avLst/>
+          </a:prstGeom>
+          <a:solidFill>
+            <a:schemeClr val="tx2">
+              <a:lumMod val="60000"/>
+              <a:lumOff val="40000"/>
+            </a:schemeClr>
+          </a:solidFill>
+          <a:ln>
+            <a:noFill/>
+          </a:ln>
+        </p:spPr>
+        <p:style>
+          <a:lnRef idx="2">
+            <a:schemeClr val="accent1">
+              <a:shade val="50000"/>
+            </a:schemeClr>
+          </a:lnRef>
+          <a:fillRef idx="1">
+            <a:schemeClr val="accent1"/>
+          </a:fillRef>
+          <a:effectRef idx="0">
+            <a:schemeClr val="accent1"/>
+          </a:effectRef>
+          <a:fontRef idx="minor">
+            <a:schemeClr val="lt1"/>
+          </a:fontRef>
+        </p:style>
       </p:sp>
     </p:spTree>
     <p:extLst>
       <p:ext uri="{BB962C8B-B14F-4D97-AF65-F5344CB8AC3E}">
-        <p14:creationId xmlns:p14="http://schemas.microsoft.com/office/powerpoint/2010/main" val="3078170516"/>
+        <p14:creationId xmlns:p14="http://schemas.microsoft.com/office/powerpoint/2010/main" val="4005454041"/>
       </p:ext>
     </p:extLst>
   </p:cSld>
@@ -2700,7 +3430,7 @@
               <a:lnSpc>
                 <a:spcPct val="85000"/>
               </a:lnSpc>
-              <a:defRPr sz="7200" b="0"/>
+              <a:defRPr sz="7200" b="1"/>
             </a:lvl1pPr>
           </a:lstStyle>
           <a:p>
@@ -2735,11 +3465,11 @@
           <a:lstStyle>
             <a:lvl1pPr marL="0" indent="0">
               <a:buNone/>
-              <a:defRPr sz="2200">
+              <a:defRPr sz="2200" spc="30" baseline="0">
                 <a:solidFill>
                   <a:schemeClr val="tx1">
-                    <a:lumMod val="65000"/>
-                    <a:lumOff val="35000"/>
+                    <a:lumMod val="50000"/>
+                    <a:lumOff val="50000"/>
                   </a:schemeClr>
                 </a:solidFill>
               </a:defRPr>
@@ -2893,7 +3623,7 @@
           <a:p>
             <a:fld id="{53235728-76D6-45A1-8670-75A93D312883}" type="slidenum">
               <a:rPr lang="en-US" smtClean="0"/>
-              <a:t>‹#›</a:t>
+              <a:t>‹Nr.›</a:t>
             </a:fld>
             <a:endParaRPr lang="en-US"/>
           </a:p>
@@ -2901,7 +3631,7 @@
       </p:sp>
       <p:sp>
         <p:nvSpPr>
-          <p:cNvPr id="7" name="Rectangle 6"/>
+          <p:cNvPr id="8" name="Rectangle 7"/>
           <p:cNvSpPr/>
           <p:nvPr/>
         </p:nvSpPr>
@@ -2914,7 +3644,10 @@
             <a:avLst/>
           </a:prstGeom>
           <a:solidFill>
-            <a:schemeClr val="accent1"/>
+            <a:schemeClr val="tx2">
+              <a:lumMod val="60000"/>
+              <a:lumOff val="40000"/>
+            </a:schemeClr>
           </a:solidFill>
           <a:ln>
             <a:noFill/>
@@ -2940,7 +3673,7 @@
     </p:spTree>
     <p:extLst>
       <p:ext uri="{BB962C8B-B14F-4D97-AF65-F5344CB8AC3E}">
-        <p14:creationId xmlns:p14="http://schemas.microsoft.com/office/powerpoint/2010/main" val="3729163839"/>
+        <p14:creationId xmlns:p14="http://schemas.microsoft.com/office/powerpoint/2010/main" val="1667318531"/>
       </p:ext>
     </p:extLst>
   </p:cSld>
@@ -3010,13 +3743,13 @@
           <a:bodyPr/>
           <a:lstStyle>
             <a:lvl1pPr>
-              <a:defRPr sz="1800"/>
+              <a:defRPr sz="2000"/>
             </a:lvl1pPr>
             <a:lvl2pPr>
-              <a:defRPr sz="1600"/>
+              <a:defRPr sz="1800"/>
             </a:lvl2pPr>
             <a:lvl3pPr>
-              <a:defRPr sz="1400"/>
+              <a:defRPr sz="1600"/>
             </a:lvl3pPr>
             <a:lvl4pPr>
               <a:defRPr sz="1400"/>
@@ -3095,13 +3828,13 @@
           <a:bodyPr/>
           <a:lstStyle>
             <a:lvl1pPr>
-              <a:defRPr sz="1800"/>
+              <a:defRPr sz="2000"/>
             </a:lvl1pPr>
             <a:lvl2pPr>
-              <a:defRPr sz="1600"/>
+              <a:defRPr sz="1800"/>
             </a:lvl2pPr>
             <a:lvl3pPr>
-              <a:defRPr sz="1400"/>
+              <a:defRPr sz="1600"/>
             </a:lvl3pPr>
             <a:lvl4pPr>
               <a:defRPr sz="1400"/>
@@ -3219,16 +3952,57 @@
           <a:p>
             <a:fld id="{53235728-76D6-45A1-8670-75A93D312883}" type="slidenum">
               <a:rPr lang="en-US" smtClean="0"/>
-              <a:t>‹#›</a:t>
+              <a:t>‹Nr.›</a:t>
             </a:fld>
             <a:endParaRPr lang="en-US"/>
           </a:p>
         </p:txBody>
+      </p:sp>
+      <p:sp>
+        <p:nvSpPr>
+          <p:cNvPr id="8" name="Rectangle 7"/>
+          <p:cNvSpPr/>
+          <p:nvPr/>
+        </p:nvSpPr>
+        <p:spPr>
+          <a:xfrm>
+            <a:off x="0" y="0"/>
+            <a:ext cx="457200" cy="6858000"/>
+          </a:xfrm>
+          <a:prstGeom prst="rect">
+            <a:avLst/>
+          </a:prstGeom>
+          <a:solidFill>
+            <a:schemeClr val="tx2">
+              <a:lumMod val="60000"/>
+              <a:lumOff val="40000"/>
+            </a:schemeClr>
+          </a:solidFill>
+          <a:ln>
+            <a:noFill/>
+          </a:ln>
+        </p:spPr>
+        <p:style>
+          <a:lnRef idx="2">
+            <a:schemeClr val="accent1">
+              <a:shade val="50000"/>
+            </a:schemeClr>
+          </a:lnRef>
+          <a:fillRef idx="1">
+            <a:schemeClr val="accent1"/>
+          </a:fillRef>
+          <a:effectRef idx="0">
+            <a:schemeClr val="accent1"/>
+          </a:effectRef>
+          <a:fontRef idx="minor">
+            <a:schemeClr val="lt1"/>
+          </a:fontRef>
+        </p:style>
       </p:sp>
     </p:spTree>
     <p:extLst>
       <p:ext uri="{BB962C8B-B14F-4D97-AF65-F5344CB8AC3E}">
-        <p14:creationId xmlns:p14="http://schemas.microsoft.com/office/powerpoint/2010/main" val="2313783419"/>
+        <p14:creationId xmlns:p14="http://schemas.microsoft.com/office/powerpoint/2010/main" val="723880503"/>
       </p:ext>
     </p:extLst>
   </p:cSld>
@@ -3670,16 +4444,57 @@
           <a:p>
             <a:fld id="{53235728-76D6-45A1-8670-75A93D312883}" type="slidenum">
               <a:rPr lang="en-US" smtClean="0"/>
-              <a:t>‹#›</a:t>
+              <a:t>‹Nr.›</a:t>
             </a:fld>
             <a:endParaRPr lang="en-US"/>
           </a:p>
         </p:txBody>
+      </p:sp>
+      <p:sp>
+        <p:nvSpPr>
+          <p:cNvPr id="11" name="Rectangle 10"/>
+          <p:cNvSpPr/>
+          <p:nvPr/>
+        </p:nvSpPr>
+        <p:spPr>
+          <a:xfrm>
+            <a:off x="0" y="0"/>
+            <a:ext cx="457200" cy="6858000"/>
+          </a:xfrm>
+          <a:prstGeom prst="rect">
+            <a:avLst/>
+          </a:prstGeom>
+          <a:solidFill>
+            <a:schemeClr val="tx2">
+              <a:lumMod val="60000"/>
+              <a:lumOff val="40000"/>
+            </a:schemeClr>
+          </a:solidFill>
+          <a:ln>
+            <a:noFill/>
+          </a:ln>
+        </p:spPr>
+        <p:style>
+          <a:lnRef idx="2">
+            <a:schemeClr val="accent1">
+              <a:shade val="50000"/>
+            </a:schemeClr>
+          </a:lnRef>
+          <a:fillRef idx="1">
+            <a:schemeClr val="accent1"/>
+          </a:fillRef>
+          <a:effectRef idx="0">
+            <a:schemeClr val="accent1"/>
+          </a:effectRef>
+          <a:fontRef idx="minor">
+            <a:schemeClr val="lt1"/>
+          </a:fontRef>
+        </p:style>
       </p:sp>
     </p:spTree>
     <p:extLst>
       <p:ext uri="{BB962C8B-B14F-4D97-AF65-F5344CB8AC3E}">
-        <p14:creationId xmlns:p14="http://schemas.microsoft.com/office/powerpoint/2010/main" val="2349238771"/>
+        <p14:creationId xmlns:p14="http://schemas.microsoft.com/office/powerpoint/2010/main" val="1328968020"/>
       </p:ext>
     </p:extLst>
   </p:cSld>
@@ -3788,16 +4603,57 @@
           <a:p>
             <a:fld id="{53235728-76D6-45A1-8670-75A93D312883}" type="slidenum">
               <a:rPr lang="en-US" smtClean="0"/>
-              <a:t>‹#›</a:t>
+              <a:t>‹Nr.›</a:t>
             </a:fld>
             <a:endParaRPr lang="en-US"/>
           </a:p>
         </p:txBody>
+      </p:sp>
+      <p:sp>
+        <p:nvSpPr>
+          <p:cNvPr id="7" name="Rectangle 6"/>
+          <p:cNvSpPr/>
+          <p:nvPr/>
+        </p:nvSpPr>
+        <p:spPr>
+          <a:xfrm>
+            <a:off x="0" y="0"/>
+            <a:ext cx="457200" cy="6858000"/>
+          </a:xfrm>
+          <a:prstGeom prst="rect">
+            <a:avLst/>
+          </a:prstGeom>
+          <a:solidFill>
+            <a:schemeClr val="tx2">
+              <a:lumMod val="60000"/>
+              <a:lumOff val="40000"/>
+            </a:schemeClr>
+          </a:solidFill>
+          <a:ln>
+            <a:noFill/>
+          </a:ln>
+        </p:spPr>
+        <p:style>
+          <a:lnRef idx="2">
+            <a:schemeClr val="accent1">
+              <a:shade val="50000"/>
+            </a:schemeClr>
+          </a:lnRef>
+          <a:fillRef idx="1">
+            <a:schemeClr val="accent1"/>
+          </a:fillRef>
+          <a:effectRef idx="0">
+            <a:schemeClr val="accent1"/>
+          </a:effectRef>
+          <a:fontRef idx="minor">
+            <a:schemeClr val="lt1"/>
+          </a:fontRef>
+        </p:style>
       </p:sp>
     </p:spTree>
     <p:extLst>
       <p:ext uri="{BB962C8B-B14F-4D97-AF65-F5344CB8AC3E}">
-        <p14:creationId xmlns:p14="http://schemas.microsoft.com/office/powerpoint/2010/main" val="3710528996"/>
+        <p14:creationId xmlns:p14="http://schemas.microsoft.com/office/powerpoint/2010/main" val="769855615"/>
       </p:ext>
     </p:extLst>
   </p:cSld>
@@ -3883,16 +4739,57 @@
           <a:p>
             <a:fld id="{53235728-76D6-45A1-8670-75A93D312883}" type="slidenum">
               <a:rPr lang="en-US" smtClean="0"/>
-              <a:t>‹#›</a:t>
+              <a:t>‹Nr.›</a:t>
             </a:fld>
             <a:endParaRPr lang="en-US"/>
           </a:p>
         </p:txBody>
+      </p:sp>
+      <p:sp>
+        <p:nvSpPr>
+          <p:cNvPr id="5" name="Rectangle 4"/>
+          <p:cNvSpPr/>
+          <p:nvPr/>
+        </p:nvSpPr>
+        <p:spPr>
+          <a:xfrm>
+            <a:off x="0" y="0"/>
+            <a:ext cx="457200" cy="6858000"/>
+          </a:xfrm>
+          <a:prstGeom prst="rect">
+            <a:avLst/>
+          </a:prstGeom>
+          <a:solidFill>
+            <a:schemeClr val="tx2">
+              <a:lumMod val="60000"/>
+              <a:lumOff val="40000"/>
+            </a:schemeClr>
+          </a:solidFill>
+          <a:ln>
+            <a:noFill/>
+          </a:ln>
+        </p:spPr>
+        <p:style>
+          <a:lnRef idx="2">
+            <a:schemeClr val="accent1">
+              <a:shade val="50000"/>
+            </a:schemeClr>
+          </a:lnRef>
+          <a:fillRef idx="1">
+            <a:schemeClr val="accent1"/>
+          </a:fillRef>
+          <a:effectRef idx="0">
+            <a:schemeClr val="accent1"/>
+          </a:effectRef>
+          <a:fontRef idx="minor">
+            <a:schemeClr val="lt1"/>
+          </a:fontRef>
+        </p:style>
       </p:sp>
     </p:spTree>
     <p:extLst>
       <p:ext uri="{BB962C8B-B14F-4D97-AF65-F5344CB8AC3E}">
-        <p14:creationId xmlns:p14="http://schemas.microsoft.com/office/powerpoint/2010/main" val="1905956151"/>
+        <p14:creationId xmlns:p14="http://schemas.microsoft.com/office/powerpoint/2010/main" val="3187682207"/>
       </p:ext>
     </p:extLst>
   </p:cSld>
@@ -3941,7 +4838,7 @@
           </a:bodyPr>
           <a:lstStyle>
             <a:lvl1pPr>
-              <a:defRPr sz="3200" b="0" baseline="0"/>
+              <a:defRPr sz="2800" b="1" baseline="0"/>
             </a:lvl1pPr>
           </a:lstStyle>
           <a:p>
@@ -4067,7 +4964,7 @@
                 <a:spcPts val="800"/>
               </a:spcBef>
               <a:buNone/>
-              <a:defRPr sz="1300"/>
+              <a:defRPr sz="1400"/>
             </a:lvl1pPr>
             <a:lvl2pPr marL="457200" indent="0">
               <a:buNone/>
@@ -4170,7 +5067,7 @@
           <a:p>
             <a:fld id="{53235728-76D6-45A1-8670-75A93D312883}" type="slidenum">
               <a:rPr lang="en-US" smtClean="0"/>
-              <a:t>‹#›</a:t>
+              <a:t>‹Nr.›</a:t>
             </a:fld>
             <a:endParaRPr lang="en-US"/>
           </a:p>
@@ -4179,7 +5076,7 @@
     </p:spTree>
     <p:extLst>
       <p:ext uri="{BB962C8B-B14F-4D97-AF65-F5344CB8AC3E}">
-        <p14:creationId xmlns:p14="http://schemas.microsoft.com/office/powerpoint/2010/main" val="4156563358"/>
+        <p14:creationId xmlns:p14="http://schemas.microsoft.com/office/powerpoint/2010/main" val="697793415"/>
       </p:ext>
     </p:extLst>
   </p:cSld>
@@ -4221,7 +5118,7 @@
             <a:avLst/>
           </a:prstGeom>
           <a:solidFill>
-            <a:srgbClr val="000000"/>
+            <a:schemeClr val="tx2"/>
           </a:solidFill>
           <a:ln>
             <a:noFill/>
@@ -4266,7 +5163,7 @@
           </a:bodyPr>
           <a:lstStyle>
             <a:lvl1pPr>
-              <a:defRPr sz="2800" b="0">
+              <a:defRPr sz="2800" b="1">
                 <a:solidFill>
                   <a:schemeClr val="bg1"/>
                 </a:solidFill>
@@ -4297,23 +5194,13 @@
             <a:off x="0" y="0"/>
             <a:ext cx="11292840" cy="5128923"/>
           </a:xfrm>
-          <a:blipFill>
-            <a:blip r:embed="rId2"/>
-            <a:stretch>
-              <a:fillRect/>
-            </a:stretch>
-          </a:blipFill>
         </p:spPr>
         <p:txBody>
           <a:bodyPr anchor="t"/>
           <a:lstStyle>
             <a:lvl1pPr marL="0" indent="0">
               <a:buNone/>
-              <a:defRPr sz="3200">
-                <a:solidFill>
-                  <a:schemeClr val="bg1"/>
-                </a:solidFill>
-              </a:defRPr>
+              <a:defRPr sz="3200"/>
             </a:lvl1pPr>
             <a:lvl2pPr marL="457200" indent="0">
               <a:buNone/>
@@ -4386,10 +5273,10 @@
                 <a:spcPts val="800"/>
               </a:spcBef>
               <a:buNone/>
-              <a:defRPr sz="1300">
+              <a:defRPr sz="1400" baseline="0">
                 <a:solidFill>
                   <a:schemeClr val="bg1">
-                    <a:lumMod val="85000"/>
+                    <a:lumMod val="75000"/>
                   </a:schemeClr>
                 </a:solidFill>
               </a:defRPr>
@@ -4495,7 +5382,7 @@
           <a:p>
             <a:fld id="{53235728-76D6-45A1-8670-75A93D312883}" type="slidenum">
               <a:rPr lang="en-US" smtClean="0"/>
-              <a:t>‹#›</a:t>
+              <a:t>‹Nr.›</a:t>
             </a:fld>
             <a:endParaRPr lang="en-US"/>
           </a:p>
@@ -4504,7 +5391,7 @@
     </p:spTree>
     <p:extLst>
       <p:ext uri="{BB962C8B-B14F-4D97-AF65-F5344CB8AC3E}">
-        <p14:creationId xmlns:p14="http://schemas.microsoft.com/office/powerpoint/2010/main" val="1421260290"/>
+        <p14:creationId xmlns:p14="http://schemas.microsoft.com/office/powerpoint/2010/main" val="1819122482"/>
       </p:ext>
     </p:extLst>
   </p:cSld>
@@ -4551,9 +5438,7 @@
             <a:avLst/>
           </a:prstGeom>
           <a:solidFill>
-            <a:schemeClr val="tx2">
-              <a:lumMod val="75000"/>
-            </a:schemeClr>
+            <a:schemeClr val="accent1"/>
           </a:solidFill>
           <a:ln>
             <a:noFill/>
@@ -4588,15 +5473,15 @@
         </p:nvSpPr>
         <p:spPr>
           <a:xfrm>
-            <a:off x="1261872" y="365760"/>
-            <a:ext cx="9692640" cy="1325562"/>
+            <a:off x="1261872" y="294198"/>
+            <a:ext cx="9692640" cy="1397124"/>
           </a:xfrm>
           <a:prstGeom prst="rect">
             <a:avLst/>
           </a:prstGeom>
         </p:spPr>
         <p:txBody>
-          <a:bodyPr vert="horz" lIns="91440" tIns="45720" rIns="91440" bIns="45720" rtlCol="0" anchor="b">
+          <a:bodyPr vert="horz" lIns="91440" tIns="27432" rIns="91440" bIns="45720" rtlCol="0" anchor="b">
             <a:normAutofit/>
           </a:bodyPr>
           <a:lstStyle/>
@@ -4696,9 +5581,9 @@
             <a:lvl1pPr algn="r">
               <a:defRPr sz="1050" b="0">
                 <a:solidFill>
-                  <a:schemeClr val="tx2">
-                    <a:lumMod val="20000"/>
-                    <a:lumOff val="80000"/>
+                  <a:schemeClr val="accent1">
+                    <a:lumMod val="40000"/>
+                    <a:lumOff val="60000"/>
                   </a:schemeClr>
                 </a:solidFill>
               </a:defRPr>
@@ -4738,9 +5623,9 @@
             <a:lvl1pPr algn="l">
               <a:defRPr sz="1050">
                 <a:solidFill>
-                  <a:schemeClr val="tx2">
-                    <a:lumMod val="20000"/>
-                    <a:lumOff val="80000"/>
+                  <a:schemeClr val="accent1">
+                    <a:lumMod val="40000"/>
+                    <a:lumOff val="60000"/>
                   </a:schemeClr>
                 </a:solidFill>
               </a:defRPr>
@@ -4778,18 +5663,19 @@
             <a:lvl1pPr algn="ctr">
               <a:defRPr sz="3600">
                 <a:solidFill>
-                  <a:schemeClr val="tx2">
+                  <a:schemeClr val="accent1">
                     <a:lumMod val="60000"/>
                     <a:lumOff val="40000"/>
                   </a:schemeClr>
                 </a:solidFill>
+                <a:latin typeface="+mj-lt"/>
               </a:defRPr>
             </a:lvl1pPr>
           </a:lstStyle>
           <a:p>
             <a:fld id="{53235728-76D6-45A1-8670-75A93D312883}" type="slidenum">
               <a:rPr lang="en-US" smtClean="0"/>
-              <a:t>‹#›</a:t>
+              <a:t>‹Nr.›</a:t>
             </a:fld>
             <a:endParaRPr lang="en-US"/>
           </a:p>
@@ -4798,23 +5684,23 @@
     </p:spTree>
     <p:extLst>
       <p:ext uri="{BB962C8B-B14F-4D97-AF65-F5344CB8AC3E}">
-        <p14:creationId xmlns:p14="http://schemas.microsoft.com/office/powerpoint/2010/main" val="2939970571"/>
+        <p14:creationId xmlns:p14="http://schemas.microsoft.com/office/powerpoint/2010/main" val="709498955"/>
       </p:ext>
     </p:extLst>
   </p:cSld>
   <p:clrMap bg1="lt1" tx1="dk1" bg2="lt2" tx2="dk2" accent1="accent1" accent2="accent2" accent3="accent3" accent4="accent4" accent5="accent5" accent6="accent6" hlink="hlink" folHlink="folHlink"/>
   <p:sldLayoutIdLst>
-    <p:sldLayoutId id="2147483709" r:id="rId1"/>
-    <p:sldLayoutId id="2147483710" r:id="rId2"/>
-    <p:sldLayoutId id="2147483711" r:id="rId3"/>
-    <p:sldLayoutId id="2147483712" r:id="rId4"/>
-    <p:sldLayoutId id="2147483713" r:id="rId5"/>
-    <p:sldLayoutId id="2147483714" r:id="rId6"/>
-    <p:sldLayoutId id="2147483715" r:id="rId7"/>
-    <p:sldLayoutId id="2147483716" r:id="rId8"/>
-    <p:sldLayoutId id="2147483717" r:id="rId9"/>
-    <p:sldLayoutId id="2147483718" r:id="rId10"/>
-    <p:sldLayoutId id="2147483719" r:id="rId11"/>
+    <p:sldLayoutId id="2147483721" r:id="rId1"/>
+    <p:sldLayoutId id="2147483722" r:id="rId2"/>
+    <p:sldLayoutId id="2147483723" r:id="rId3"/>
+    <p:sldLayoutId id="2147483724" r:id="rId4"/>
+    <p:sldLayoutId id="2147483725" r:id="rId5"/>
+    <p:sldLayoutId id="2147483726" r:id="rId6"/>
+    <p:sldLayoutId id="2147483727" r:id="rId7"/>
+    <p:sldLayoutId id="2147483728" r:id="rId8"/>
+    <p:sldLayoutId id="2147483729" r:id="rId9"/>
+    <p:sldLayoutId id="2147483730" r:id="rId10"/>
+    <p:sldLayoutId id="2147483731" r:id="rId11"/>
   </p:sldLayoutIdLst>
   <p:txStyles>
     <p:titleStyle>
@@ -4826,9 +5712,9 @@
           <a:spcPct val="0"/>
         </a:spcBef>
         <a:buNone/>
-        <a:defRPr sz="4400" kern="1200" spc="-50" baseline="0">
+        <a:defRPr sz="4400" b="1" kern="1200" spc="-50" baseline="0">
           <a:solidFill>
-            <a:schemeClr val="tx1"/>
+            <a:schemeClr val="accent1"/>
           </a:solidFill>
           <a:latin typeface="+mj-lt"/>
           <a:ea typeface="+mj-ea"/>
@@ -4853,9 +5739,12 @@
         <a:buSzPct val="80000"/>
         <a:buFont typeface="Arial" pitchFamily="34" charset="0"/>
         <a:buChar char="•"/>
-        <a:defRPr sz="1800" kern="1200" spc="10" baseline="0">
+        <a:defRPr sz="2000" kern="1200" spc="10" baseline="0">
           <a:solidFill>
-            <a:schemeClr val="tx1"/>
+            <a:schemeClr val="tx1">
+              <a:lumMod val="65000"/>
+              <a:lumOff val="35000"/>
+            </a:schemeClr>
           </a:solidFill>
           <a:latin typeface="+mn-lt"/>
           <a:ea typeface="+mn-ea"/>
@@ -4877,11 +5766,11 @@
         </a:buClr>
         <a:buFont typeface="Wingdings 2" pitchFamily="18" charset="2"/>
         <a:buChar char=""/>
-        <a:defRPr sz="1600" kern="1200">
+        <a:defRPr sz="1800" kern="1200">
           <a:solidFill>
             <a:schemeClr val="tx1">
-              <a:lumMod val="85000"/>
-              <a:lumOff val="15000"/>
+              <a:lumMod val="65000"/>
+              <a:lumOff val="35000"/>
             </a:schemeClr>
           </a:solidFill>
           <a:latin typeface="+mn-lt"/>
@@ -4904,11 +5793,11 @@
         </a:buClr>
         <a:buFont typeface="Wingdings 2" pitchFamily="18" charset="2"/>
         <a:buChar char=""/>
-        <a:defRPr sz="1400" kern="1200">
+        <a:defRPr sz="1600" kern="1200">
           <a:solidFill>
             <a:schemeClr val="tx1">
-              <a:lumMod val="85000"/>
-              <a:lumOff val="15000"/>
+              <a:lumMod val="65000"/>
+              <a:lumOff val="35000"/>
             </a:schemeClr>
           </a:solidFill>
           <a:latin typeface="+mn-lt"/>
@@ -4934,8 +5823,8 @@
         <a:defRPr sz="1400" kern="1200">
           <a:solidFill>
             <a:schemeClr val="tx1">
-              <a:lumMod val="85000"/>
-              <a:lumOff val="15000"/>
+              <a:lumMod val="65000"/>
+              <a:lumOff val="35000"/>
             </a:schemeClr>
           </a:solidFill>
           <a:latin typeface="+mn-lt"/>
@@ -4961,8 +5850,8 @@
         <a:defRPr sz="1400" kern="1200">
           <a:solidFill>
             <a:schemeClr val="tx1">
-              <a:lumMod val="85000"/>
-              <a:lumOff val="15000"/>
+              <a:lumMod val="65000"/>
+              <a:lumOff val="35000"/>
             </a:schemeClr>
           </a:solidFill>
           <a:latin typeface="+mn-lt"/>
@@ -4988,8 +5877,8 @@
         <a:defRPr sz="1400" kern="1200">
           <a:solidFill>
             <a:schemeClr val="tx1">
-              <a:lumMod val="85000"/>
-              <a:lumOff val="15000"/>
+              <a:lumMod val="65000"/>
+              <a:lumOff val="35000"/>
             </a:schemeClr>
           </a:solidFill>
           <a:latin typeface="+mn-lt"/>
@@ -5015,8 +5904,8 @@
         <a:defRPr sz="1400" kern="1200">
           <a:solidFill>
             <a:schemeClr val="tx1">
-              <a:lumMod val="85000"/>
-              <a:lumOff val="15000"/>
+              <a:lumMod val="65000"/>
+              <a:lumOff val="35000"/>
             </a:schemeClr>
           </a:solidFill>
           <a:latin typeface="+mn-lt"/>
@@ -5042,8 +5931,8 @@
         <a:defRPr sz="1400" kern="1200">
           <a:solidFill>
             <a:schemeClr val="tx1">
-              <a:lumMod val="85000"/>
-              <a:lumOff val="15000"/>
+              <a:lumMod val="65000"/>
+              <a:lumOff val="35000"/>
             </a:schemeClr>
           </a:solidFill>
           <a:latin typeface="+mn-lt"/>
@@ -5069,8 +5958,8 @@
         <a:defRPr sz="1400" kern="1200">
           <a:solidFill>
             <a:schemeClr val="tx1">
-              <a:lumMod val="85000"/>
-              <a:lumOff val="15000"/>
+              <a:lumMod val="65000"/>
+              <a:lumOff val="35000"/>
             </a:schemeClr>
           </a:solidFill>
           <a:latin typeface="+mn-lt"/>
@@ -5603,67 +6492,6 @@
           <a:chExt cx="0" cy="0"/>
         </a:xfrm>
       </p:grpSpPr>
-      <p:sp>
-        <p:nvSpPr>
-          <p:cNvPr id="2" name="Titel 1">
-            <a:extLst>
-              <a:ext uri="{FF2B5EF4-FFF2-40B4-BE49-F238E27FC236}">
-                <a16:creationId xmlns:a16="http://schemas.microsoft.com/office/drawing/2014/main" id="{EAF26871-93BF-482D-A289-FA9DD8048341}"/>
-              </a:ext>
-            </a:extLst>
-          </p:cNvPr>
-          <p:cNvSpPr>
-            <a:spLocks noGrp="1"/>
-          </p:cNvSpPr>
-          <p:nvPr>
-            <p:ph type="title"/>
-          </p:nvPr>
-        </p:nvSpPr>
-        <p:spPr/>
-        <p:txBody>
-          <a:bodyPr/>
-          <a:lstStyle/>
-          <a:p>
-            <a:endParaRPr lang="en-US" dirty="0"/>
-          </a:p>
-        </p:txBody>
-      </p:sp>
-      <p:sp>
-        <p:nvSpPr>
-          <p:cNvPr id="6" name="Textfeld 5">
-            <a:extLst>
-              <a:ext uri="{FF2B5EF4-FFF2-40B4-BE49-F238E27FC236}">
-                <a16:creationId xmlns:a16="http://schemas.microsoft.com/office/drawing/2014/main" id="{3D31996B-CF9E-4A7E-8682-8E1621A9A001}"/>
-              </a:ext>
-            </a:extLst>
-          </p:cNvPr>
-          <p:cNvSpPr txBox="1"/>
-          <p:nvPr/>
-        </p:nvSpPr>
-        <p:spPr>
-          <a:xfrm rot="10800000" flipH="1" flipV="1">
-            <a:off x="459889" y="181094"/>
-            <a:ext cx="2478259" cy="369332"/>
-          </a:xfrm>
-          <a:prstGeom prst="rect">
-            <a:avLst/>
-          </a:prstGeom>
-          <a:noFill/>
-        </p:spPr>
-        <p:txBody>
-          <a:bodyPr wrap="square" rtlCol="0">
-            <a:spAutoFit/>
-          </a:bodyPr>
-          <a:lstStyle/>
-          <a:p>
-            <a:r>
-              <a:rPr lang="en-US" dirty="0" err="1"/>
-              <a:t>Klassendiagramm</a:t>
-            </a:r>
-            <a:endParaRPr lang="en-US" dirty="0"/>
-          </a:p>
-        </p:txBody>
-      </p:sp>
       <p:pic>
         <p:nvPicPr>
           <p:cNvPr id="10" name="Inhaltsplatzhalter 9" descr="Ein Bild, das Text, Karte enthält.&#10;&#10;Automatisch generierte Beschreibung">
@@ -5694,11 +6522,45 @@
         </p:blipFill>
         <p:spPr>
           <a:xfrm>
-            <a:off x="158274" y="550426"/>
-            <a:ext cx="11875451" cy="5956299"/>
+            <a:off x="97422" y="840658"/>
+            <a:ext cx="11997156" cy="6017342"/>
           </a:xfrm>
         </p:spPr>
       </p:pic>
+      <p:sp>
+        <p:nvSpPr>
+          <p:cNvPr id="2" name="Titel 1">
+            <a:extLst>
+              <a:ext uri="{FF2B5EF4-FFF2-40B4-BE49-F238E27FC236}">
+                <a16:creationId xmlns:a16="http://schemas.microsoft.com/office/drawing/2014/main" id="{EAF26871-93BF-482D-A289-FA9DD8048341}"/>
+              </a:ext>
+            </a:extLst>
+          </p:cNvPr>
+          <p:cNvSpPr>
+            <a:spLocks noGrp="1"/>
+          </p:cNvSpPr>
+          <p:nvPr>
+            <p:ph type="title"/>
+          </p:nvPr>
+        </p:nvSpPr>
+        <p:spPr>
+          <a:xfrm>
+            <a:off x="642440" y="294198"/>
+            <a:ext cx="9692640" cy="826679"/>
+          </a:xfrm>
+        </p:spPr>
+        <p:txBody>
+          <a:bodyPr/>
+          <a:lstStyle/>
+          <a:p>
+            <a:r>
+              <a:rPr lang="en-US" dirty="0" err="1"/>
+              <a:t>Klassendiagramm</a:t>
+            </a:r>
+            <a:endParaRPr lang="en-US" dirty="0"/>
+          </a:p>
+        </p:txBody>
+      </p:sp>
     </p:spTree>
     <p:extLst>
       <p:ext uri="{BB962C8B-B14F-4D97-AF65-F5344CB8AC3E}">
@@ -5745,7 +6607,12 @@
             <p:ph type="title"/>
           </p:nvPr>
         </p:nvSpPr>
-        <p:spPr/>
+        <p:spPr>
+          <a:xfrm>
+            <a:off x="1261872" y="294198"/>
+            <a:ext cx="9692640" cy="885673"/>
+          </a:xfrm>
+        </p:spPr>
         <p:txBody>
           <a:bodyPr/>
           <a:lstStyle/>
@@ -5788,8 +6655,8 @@
         </p:blipFill>
         <p:spPr>
           <a:xfrm>
-            <a:off x="2882009" y="1719950"/>
-            <a:ext cx="6427981" cy="4772290"/>
+            <a:off x="2661486" y="1179871"/>
+            <a:ext cx="6869028" cy="5099734"/>
           </a:xfrm>
         </p:spPr>
       </p:pic>
@@ -5846,7 +6713,7 @@
           <a:p>
             <a:r>
               <a:rPr lang="en-US" dirty="0"/>
-              <a:t>Solid </a:t>
+              <a:t>SOLID </a:t>
             </a:r>
             <a:r>
               <a:rPr lang="en-US" dirty="0" err="1"/>
@@ -5875,218 +6742,79 @@
         <p:spPr/>
         <p:txBody>
           <a:bodyPr>
-            <a:normAutofit fontScale="70000" lnSpcReduction="20000"/>
+            <a:normAutofit/>
           </a:bodyPr>
           <a:lstStyle/>
           <a:p>
             <a:r>
-              <a:rPr lang="en-US" dirty="0"/>
-              <a:t>Single Responsibility</a:t>
-            </a:r>
-          </a:p>
-          <a:p>
-            <a:r>
-              <a:rPr lang="en-US" dirty="0"/>
-              <a:t>Open Closed Principle</a:t>
-            </a:r>
-          </a:p>
-          <a:p>
-            <a:r>
-              <a:rPr lang="en-US" dirty="0"/>
-              <a:t>Design by Contract</a:t>
-            </a:r>
-          </a:p>
-          <a:p>
-            <a:pPr lvl="1"/>
-            <a:r>
-              <a:rPr lang="en-US" dirty="0" err="1"/>
-              <a:t>Parkhaus</a:t>
-            </a:r>
-            <a:r>
-              <a:rPr lang="en-US" dirty="0"/>
+              <a:rPr lang="en-US" b="1" dirty="0"/>
+              <a:t>Singe Responsibility Principle</a:t>
+            </a:r>
+            <a:endParaRPr lang="en-US" dirty="0"/>
+          </a:p>
+          <a:p>
+            <a:r>
+              <a:rPr lang="en-US" dirty="0"/>
+              <a:t>Open/</a:t>
+            </a:r>
+            <a:r>
+              <a:rPr lang="en-US" dirty="0" err="1"/>
+              <a:t>Closend</a:t>
+            </a:r>
+            <a:r>
+              <a:rPr lang="en-US" dirty="0"/>
+              <a:t> Principle</a:t>
+            </a:r>
+          </a:p>
+          <a:p>
+            <a:r>
+              <a:rPr lang="en-US" b="1" dirty="0" err="1"/>
+              <a:t>Liskovsches</a:t>
+            </a:r>
+            <a:r>
+              <a:rPr lang="en-US" b="1" dirty="0"/>
+              <a:t> Substitutions </a:t>
+            </a:r>
+            <a:r>
+              <a:rPr lang="en-US" b="1" dirty="0" err="1"/>
+              <a:t>Prinzip</a:t>
+            </a:r>
+            <a:endParaRPr lang="en-US" b="1" dirty="0"/>
+          </a:p>
+          <a:p>
+            <a:r>
+              <a:rPr lang="en-US" b="1" dirty="0"/>
+              <a:t>Interface Segregation</a:t>
+            </a:r>
+          </a:p>
+          <a:p>
+            <a:r>
+              <a:rPr lang="en-US" dirty="0"/>
+              <a:t>Dependency Inversion Principle</a:t>
+            </a:r>
+          </a:p>
+          <a:p>
+            <a:endParaRPr lang="en-US" b="1" dirty="0"/>
+          </a:p>
+          <a:p>
+            <a:endParaRPr lang="en-US" b="1" dirty="0"/>
+          </a:p>
+          <a:p>
+            <a:r>
+              <a:rPr lang="en-US" b="1" dirty="0" err="1"/>
+              <a:t>Sonstiges</a:t>
+            </a:r>
+            <a:r>
+              <a:rPr lang="en-US" b="1" dirty="0"/>
               <a:t> </a:t>
             </a:r>
             <a:r>
-              <a:rPr lang="en-US" dirty="0" err="1"/>
-              <a:t>überprüft</a:t>
-            </a:r>
-            <a:r>
-              <a:rPr lang="en-US" dirty="0"/>
-              <a:t> </a:t>
-            </a:r>
-            <a:r>
-              <a:rPr lang="en-US" dirty="0" err="1"/>
-              <a:t>Werte</a:t>
-            </a:r>
-            <a:r>
-              <a:rPr lang="en-US" dirty="0"/>
-              <a:t> von </a:t>
-            </a:r>
-            <a:r>
-              <a:rPr lang="en-US" dirty="0" err="1"/>
-              <a:t>Parkdecks</a:t>
-            </a:r>
-            <a:r>
-              <a:rPr lang="en-US" dirty="0"/>
-              <a:t> </a:t>
-            </a:r>
-            <a:r>
-              <a:rPr lang="en-US" dirty="0" err="1"/>
-              <a:t>nicht</a:t>
-            </a:r>
-            <a:endParaRPr lang="en-US" dirty="0"/>
-          </a:p>
-          <a:p>
-            <a:r>
-              <a:rPr lang="en-US" dirty="0" err="1"/>
-              <a:t>Funktionale</a:t>
-            </a:r>
-            <a:r>
-              <a:rPr lang="en-US" dirty="0"/>
-              <a:t> </a:t>
-            </a:r>
-            <a:r>
-              <a:rPr lang="en-US" dirty="0" err="1"/>
-              <a:t>Programmierung</a:t>
-            </a:r>
-            <a:endParaRPr lang="en-US" dirty="0"/>
-          </a:p>
-          <a:p>
-            <a:r>
-              <a:rPr lang="en-US" dirty="0" err="1"/>
-              <a:t>Evolvierbarkeit</a:t>
-            </a:r>
-            <a:endParaRPr lang="en-US" dirty="0"/>
-          </a:p>
-          <a:p>
-            <a:r>
-              <a:rPr lang="en-US" dirty="0"/>
-              <a:t>DRY </a:t>
-            </a:r>
-            <a:r>
-              <a:rPr lang="en-US" dirty="0" err="1"/>
-              <a:t>vermeidung</a:t>
-            </a:r>
-            <a:r>
-              <a:rPr lang="en-US" dirty="0"/>
-              <a:t> von </a:t>
-            </a:r>
-            <a:r>
-              <a:rPr lang="en-US" dirty="0" err="1"/>
-              <a:t>redundanzen</a:t>
-            </a:r>
-            <a:endParaRPr lang="en-US" dirty="0"/>
-          </a:p>
-          <a:p>
-            <a:r>
-              <a:rPr lang="en-US" dirty="0"/>
-              <a:t>Single </a:t>
-            </a:r>
-            <a:r>
-              <a:rPr lang="en-US" dirty="0" err="1"/>
-              <a:t>Responsipility</a:t>
-            </a:r>
-            <a:r>
-              <a:rPr lang="en-US" dirty="0"/>
-              <a:t> Principle in den </a:t>
-            </a:r>
-            <a:r>
-              <a:rPr lang="en-US" dirty="0" err="1"/>
-              <a:t>klassen</a:t>
-            </a:r>
-            <a:endParaRPr lang="en-US" dirty="0"/>
-          </a:p>
-          <a:p>
-            <a:r>
-              <a:rPr lang="en-US" dirty="0"/>
-              <a:t> </a:t>
-            </a:r>
-            <a:r>
-              <a:rPr lang="en-US" dirty="0" err="1"/>
-              <a:t>eine</a:t>
-            </a:r>
-            <a:r>
-              <a:rPr lang="en-US" dirty="0"/>
-              <a:t> </a:t>
-            </a:r>
-            <a:r>
-              <a:rPr lang="en-US" dirty="0" err="1"/>
-              <a:t>verantworklichkeit</a:t>
-            </a:r>
-            <a:r>
-              <a:rPr lang="en-US" dirty="0"/>
-              <a:t> pro </a:t>
-            </a:r>
-            <a:r>
-              <a:rPr lang="en-US" dirty="0" err="1"/>
-              <a:t>klasse</a:t>
-            </a:r>
-            <a:r>
-              <a:rPr lang="en-US" dirty="0"/>
-              <a:t> </a:t>
-            </a:r>
-            <a:r>
-              <a:rPr lang="en-US" dirty="0" err="1"/>
-              <a:t>nur</a:t>
-            </a:r>
-            <a:r>
-              <a:rPr lang="en-US" dirty="0"/>
-              <a:t> </a:t>
-            </a:r>
-            <a:r>
-              <a:rPr lang="en-US" dirty="0" err="1"/>
-              <a:t>ein</a:t>
-            </a:r>
-            <a:r>
-              <a:rPr lang="en-US" dirty="0"/>
-              <a:t> </a:t>
-            </a:r>
-            <a:r>
-              <a:rPr lang="en-US" dirty="0" err="1"/>
-              <a:t>thema</a:t>
-            </a:r>
-            <a:r>
-              <a:rPr lang="en-US" dirty="0"/>
-              <a:t>, </a:t>
-            </a:r>
-            <a:r>
-              <a:rPr lang="en-US" dirty="0" err="1"/>
-              <a:t>einfachheit</a:t>
-            </a:r>
-            <a:r>
-              <a:rPr lang="en-US" dirty="0"/>
-              <a:t>-&gt; </a:t>
-            </a:r>
-            <a:r>
-              <a:rPr lang="en-US" dirty="0" err="1"/>
-              <a:t>Zerlegung</a:t>
-            </a:r>
-            <a:r>
-              <a:rPr lang="en-US" dirty="0"/>
-              <a:t> von Klassen</a:t>
-            </a:r>
-          </a:p>
-          <a:p>
-            <a:endParaRPr lang="en-US" dirty="0"/>
-          </a:p>
-          <a:p>
-            <a:r>
-              <a:rPr lang="en-US" dirty="0"/>
-              <a:t>Patterns singleton </a:t>
-            </a:r>
-            <a:r>
-              <a:rPr lang="en-US" dirty="0" err="1"/>
-              <a:t>emuns</a:t>
-            </a:r>
-            <a:endParaRPr lang="en-US" dirty="0"/>
-          </a:p>
-          <a:p>
-            <a:endParaRPr lang="en-US" dirty="0"/>
-          </a:p>
-          <a:p>
-            <a:r>
-              <a:rPr lang="en-US" dirty="0"/>
-              <a:t>	</a:t>
+              <a:rPr lang="en-US" b="1" dirty="0" err="1"/>
+              <a:t>Prinzip</a:t>
+            </a:r>
+            <a:r>
+              <a:rPr lang="en-US" b="1" dirty="0"/>
+              <a:t>: Design by Contract </a:t>
             </a:r>
           </a:p>
         </p:txBody>
@@ -6256,40 +6984,40 @@
   <a:themeElements>
     <a:clrScheme name="Aussicht">
       <a:dk1>
-        <a:srgbClr val="000000"/>
+        <a:sysClr val="windowText" lastClr="000000"/>
       </a:dk1>
       <a:lt1>
-        <a:srgbClr val="FFFFFF"/>
+        <a:sysClr val="window" lastClr="FFFFFF"/>
       </a:lt1>
       <a:dk2>
-        <a:srgbClr val="46464A"/>
+        <a:srgbClr val="696464"/>
       </a:dk2>
       <a:lt2>
-        <a:srgbClr val="D6D3CC"/>
+        <a:srgbClr val="E9E5DC"/>
       </a:lt2>
       <a:accent1>
-        <a:srgbClr val="6F6F74"/>
+        <a:srgbClr val="D34817"/>
       </a:accent1>
       <a:accent2>
-        <a:srgbClr val="92A9B9"/>
+        <a:srgbClr val="9B2D1F"/>
       </a:accent2>
       <a:accent3>
-        <a:srgbClr val="A7B789"/>
+        <a:srgbClr val="A28E6A"/>
       </a:accent3>
       <a:accent4>
-        <a:srgbClr val="B9A489"/>
+        <a:srgbClr val="956251"/>
       </a:accent4>
       <a:accent5>
-        <a:srgbClr val="8D6374"/>
+        <a:srgbClr val="918485"/>
       </a:accent5>
       <a:accent6>
-        <a:srgbClr val="9B7362"/>
+        <a:srgbClr val="855D5D"/>
       </a:accent6>
       <a:hlink>
-        <a:srgbClr val="67AABF"/>
+        <a:srgbClr val="CC9900"/>
       </a:hlink>
       <a:folHlink>
-        <a:srgbClr val="ABAFA5"/>
+        <a:srgbClr val="96A9A9"/>
       </a:folHlink>
     </a:clrScheme>
     <a:fontScheme name="Aussicht">
@@ -6378,7 +7106,7 @@
         <a:solidFill>
           <a:schemeClr val="phClr">
             <a:shade val="75000"/>
-            <a:satMod val="160000"/>
+            <a:satMod val="130000"/>
           </a:schemeClr>
         </a:solidFill>
       </a:fillStyleLst>
@@ -6498,7 +7226,7 @@
   <a:extraClrSchemeLst/>
   <a:extLst>
     <a:ext uri="{05A4C25C-085E-4340-85A3-A5531E510DB2}">
-      <thm15:themeFamily xmlns:thm15="http://schemas.microsoft.com/office/thememl/2012/main" name="View" id="{BA0EB5A6-F2D4-4F82-977B-64ADEE4A2A69}" vid="{3969A8A2-35DB-4E3B-8885-16FD20568674}"/>
+      <thm15:themeFamily xmlns:thm15="http://schemas.microsoft.com/office/thememl/2012/main" name="View" id="{BA0EB5A6-F2D4-4F82-977B-64ADEE4A2A69}" vid="{7B713C7F-58B7-4AE9-B361-B13EB9EC4C0C}"/>
     </a:ext>
   </a:extLst>
 </a:theme>

</xml_diff>